<commit_message>
Add Excution result for DWService to report_figures.pptx
</commit_message>
<xml_diff>
--- a/report_figures.pptx
+++ b/report_figures.pptx
@@ -5,10 +5,10 @@
     <p:sldMasterId id="2147483648" r:id="rId1"/>
   </p:sldMasterIdLst>
   <p:notesMasterIdLst>
-    <p:notesMasterId r:id="rId7"/>
+    <p:notesMasterId r:id="rId10"/>
   </p:notesMasterIdLst>
   <p:handoutMasterIdLst>
-    <p:handoutMasterId r:id="rId8"/>
+    <p:handoutMasterId r:id="rId11"/>
   </p:handoutMasterIdLst>
   <p:sldIdLst>
     <p:sldId id="422" r:id="rId2"/>
@@ -16,6 +16,9 @@
     <p:sldId id="424" r:id="rId4"/>
     <p:sldId id="423" r:id="rId5"/>
     <p:sldId id="425" r:id="rId6"/>
+    <p:sldId id="427" r:id="rId7"/>
+    <p:sldId id="428" r:id="rId8"/>
+    <p:sldId id="429" r:id="rId9"/>
   </p:sldIdLst>
   <p:sldSz cx="9793288" cy="6408738"/>
   <p:notesSz cx="6735763" cy="9866313"/>
@@ -254,7 +257,7 @@
           <a:p>
             <a:fld id="{74959256-2054-4F9D-AB76-9B63877416F3}" type="datetimeFigureOut">
               <a:rPr lang="ko-KR" altLang="en-US" smtClean="0"/>
-              <a:t>2019-10-23</a:t>
+              <a:t>2019-10-29</a:t>
             </a:fld>
             <a:endParaRPr lang="ko-KR" altLang="en-US"/>
           </a:p>
@@ -419,7 +422,7 @@
           <a:p>
             <a:fld id="{C3678A6B-5F59-430F-A0DB-B64309FEEBD6}" type="datetimeFigureOut">
               <a:rPr lang="ko-KR" altLang="en-US" smtClean="0"/>
-              <a:t>2019-10-23</a:t>
+              <a:t>2019-10-29</a:t>
             </a:fld>
             <a:endParaRPr lang="ko-KR" altLang="en-US"/>
           </a:p>
@@ -876,7 +879,7 @@
           <a:p>
             <a:fld id="{61104593-FFB9-46D1-8F07-2D8664242121}" type="datetime1">
               <a:rPr lang="ko-KR" altLang="en-US" smtClean="0"/>
-              <a:t>2019-10-23</a:t>
+              <a:t>2019-10-29</a:t>
             </a:fld>
             <a:endParaRPr lang="ko-KR" altLang="en-US"/>
           </a:p>
@@ -1172,7 +1175,7 @@
           <a:p>
             <a:fld id="{31186F76-B875-4596-A54C-08C67B6E235D}" type="datetime1">
               <a:rPr lang="ko-KR" altLang="en-US" smtClean="0"/>
-              <a:t>2019-10-23</a:t>
+              <a:t>2019-10-29</a:t>
             </a:fld>
             <a:endParaRPr lang="ko-KR" altLang="en-US"/>
           </a:p>
@@ -1343,7 +1346,7 @@
           <a:p>
             <a:fld id="{5F80B4BD-60D0-4FEB-A051-01F7F8ABD80D}" type="datetime1">
               <a:rPr lang="ko-KR" altLang="en-US" smtClean="0"/>
-              <a:t>2019-10-23</a:t>
+              <a:t>2019-10-29</a:t>
             </a:fld>
             <a:endParaRPr lang="ko-KR" altLang="en-US"/>
           </a:p>
@@ -1524,7 +1527,7 @@
           <a:p>
             <a:fld id="{680D8EC0-56A0-46F2-A370-E2AAA3037AB9}" type="datetime1">
               <a:rPr lang="ko-KR" altLang="en-US" smtClean="0"/>
-              <a:t>2019-10-23</a:t>
+              <a:t>2019-10-29</a:t>
             </a:fld>
             <a:endParaRPr lang="ko-KR" altLang="en-US"/>
           </a:p>
@@ -1843,7 +1846,7 @@
           <a:p>
             <a:fld id="{1383DF96-9799-4EF8-8D29-D35C85BCD63A}" type="datetime1">
               <a:rPr lang="ko-KR" altLang="en-US" smtClean="0"/>
-              <a:t>2019-10-23</a:t>
+              <a:t>2019-10-29</a:t>
             </a:fld>
             <a:endParaRPr lang="ko-KR" altLang="en-US"/>
           </a:p>
@@ -2131,7 +2134,7 @@
           <a:p>
             <a:fld id="{809A5942-3147-4CB9-A690-5FF60E2D1F3D}" type="datetime1">
               <a:rPr lang="ko-KR" altLang="en-US" smtClean="0"/>
-              <a:t>2019-10-23</a:t>
+              <a:t>2019-10-29</a:t>
             </a:fld>
             <a:endParaRPr lang="ko-KR" altLang="en-US"/>
           </a:p>
@@ -2553,7 +2556,7 @@
           <a:p>
             <a:fld id="{80A55876-858B-4C13-A328-270308DF5BC1}" type="datetime1">
               <a:rPr lang="ko-KR" altLang="en-US" smtClean="0"/>
-              <a:t>2019-10-23</a:t>
+              <a:t>2019-10-29</a:t>
             </a:fld>
             <a:endParaRPr lang="ko-KR" altLang="en-US"/>
           </a:p>
@@ -2651,7 +2654,7 @@
           <a:p>
             <a:fld id="{BA84DD85-808A-4913-BD1C-395A6E8D0361}" type="datetime1">
               <a:rPr lang="ko-KR" altLang="en-US" smtClean="0"/>
-              <a:t>2019-10-23</a:t>
+              <a:t>2019-10-29</a:t>
             </a:fld>
             <a:endParaRPr lang="ko-KR" altLang="en-US"/>
           </a:p>
@@ -2856,7 +2859,7 @@
           <a:p>
             <a:fld id="{8CF95D46-FBBB-4DA3-9E24-418E323D3CB1}" type="datetime1">
               <a:rPr lang="ko-KR" altLang="en-US" smtClean="0"/>
-              <a:t>2019-10-23</a:t>
+              <a:t>2019-10-29</a:t>
             </a:fld>
             <a:endParaRPr lang="ko-KR" altLang="en-US"/>
           </a:p>
@@ -3134,7 +3137,7 @@
           <a:p>
             <a:fld id="{282870A8-0134-44E3-B118-1F5A3493BB03}" type="datetime1">
               <a:rPr lang="ko-KR" altLang="en-US" smtClean="0"/>
-              <a:t>2019-10-23</a:t>
+              <a:t>2019-10-29</a:t>
             </a:fld>
             <a:endParaRPr lang="ko-KR" altLang="en-US"/>
           </a:p>
@@ -3356,7 +3359,7 @@
           <a:p>
             <a:fld id="{650C0672-8527-40C3-BABC-979037CE216F}" type="datetime1">
               <a:rPr lang="ko-KR" altLang="en-US" smtClean="0"/>
-              <a:t>2019-10-23</a:t>
+              <a:t>2019-10-29</a:t>
             </a:fld>
             <a:endParaRPr lang="ko-KR" altLang="en-US"/>
           </a:p>
@@ -7765,6 +7768,201 @@
     <p:extLst>
       <p:ext uri="{BB962C8B-B14F-4D97-AF65-F5344CB8AC3E}">
         <p14:creationId xmlns:p14="http://schemas.microsoft.com/office/powerpoint/2010/main" val="3173386995"/>
+      </p:ext>
+    </p:extLst>
+  </p:cSld>
+  <p:clrMapOvr>
+    <a:masterClrMapping/>
+  </p:clrMapOvr>
+  <p:transition spd="slow" advClick="0">
+    <p:push/>
+  </p:transition>
+</p:sld>
+</file>
+
+<file path=ppt/slides/slide6.xml><?xml version="1.0" encoding="utf-8"?>
+<p:sld xmlns:a="http://schemas.openxmlformats.org/drawingml/2006/main" xmlns:r="http://schemas.openxmlformats.org/officeDocument/2006/relationships" xmlns:p="http://schemas.openxmlformats.org/presentationml/2006/main">
+  <p:cSld>
+    <p:spTree>
+      <p:nvGrpSpPr>
+        <p:cNvPr id="1" name=""/>
+        <p:cNvGrpSpPr/>
+        <p:nvPr/>
+      </p:nvGrpSpPr>
+      <p:grpSpPr>
+        <a:xfrm>
+          <a:off x="0" y="0"/>
+          <a:ext cx="0" cy="0"/>
+          <a:chOff x="0" y="0"/>
+          <a:chExt cx="0" cy="0"/>
+        </a:xfrm>
+      </p:grpSpPr>
+      <p:pic>
+        <p:nvPicPr>
+          <p:cNvPr id="2" name="그림 1" descr="모니터, 컴퓨터, 실내, 전자기기이(가) 표시된 사진&#10;&#10;자동 생성된 설명">
+            <a:extLst>
+              <a:ext uri="{FF2B5EF4-FFF2-40B4-BE49-F238E27FC236}">
+                <a16:creationId xmlns:a16="http://schemas.microsoft.com/office/drawing/2014/main" id="{911BB33C-6CCB-4F8C-A60B-FE49CB7F81F7}"/>
+              </a:ext>
+            </a:extLst>
+          </p:cNvPr>
+          <p:cNvPicPr>
+            <a:picLocks noChangeAspect="1"/>
+          </p:cNvPicPr>
+          <p:nvPr/>
+        </p:nvPicPr>
+        <p:blipFill>
+          <a:blip r:embed="rId2" cstate="print">
+            <a:extLst>
+              <a:ext uri="{28A0092B-C50C-407E-A947-70E740481C1C}">
+                <a14:useLocalDpi xmlns:a14="http://schemas.microsoft.com/office/drawing/2010/main" val="0"/>
+              </a:ext>
+            </a:extLst>
+          </a:blip>
+          <a:stretch>
+            <a:fillRect/>
+          </a:stretch>
+        </p:blipFill>
+        <p:spPr>
+          <a:xfrm>
+            <a:off x="89103" y="576077"/>
+            <a:ext cx="9615082" cy="5256584"/>
+          </a:xfrm>
+          <a:prstGeom prst="rect">
+            <a:avLst/>
+          </a:prstGeom>
+        </p:spPr>
+      </p:pic>
+    </p:spTree>
+    <p:extLst>
+      <p:ext uri="{BB962C8B-B14F-4D97-AF65-F5344CB8AC3E}">
+        <p14:creationId xmlns:p14="http://schemas.microsoft.com/office/powerpoint/2010/main" val="1385185846"/>
+      </p:ext>
+    </p:extLst>
+  </p:cSld>
+  <p:clrMapOvr>
+    <a:masterClrMapping/>
+  </p:clrMapOvr>
+  <p:transition spd="slow" advClick="0">
+    <p:push/>
+  </p:transition>
+</p:sld>
+</file>
+
+<file path=ppt/slides/slide7.xml><?xml version="1.0" encoding="utf-8"?>
+<p:sld xmlns:a="http://schemas.openxmlformats.org/drawingml/2006/main" xmlns:r="http://schemas.openxmlformats.org/officeDocument/2006/relationships" xmlns:p="http://schemas.openxmlformats.org/presentationml/2006/main">
+  <p:cSld>
+    <p:spTree>
+      <p:nvGrpSpPr>
+        <p:cNvPr id="1" name=""/>
+        <p:cNvGrpSpPr/>
+        <p:nvPr/>
+      </p:nvGrpSpPr>
+      <p:grpSpPr>
+        <a:xfrm>
+          <a:off x="0" y="0"/>
+          <a:ext cx="0" cy="0"/>
+          <a:chOff x="0" y="0"/>
+          <a:chExt cx="0" cy="0"/>
+        </a:xfrm>
+      </p:grpSpPr>
+      <p:pic>
+        <p:nvPicPr>
+          <p:cNvPr id="2" name="그림 1">
+            <a:extLst>
+              <a:ext uri="{FF2B5EF4-FFF2-40B4-BE49-F238E27FC236}">
+                <a16:creationId xmlns:a16="http://schemas.microsoft.com/office/drawing/2014/main" id="{662D937F-F57E-4EAB-84CC-6FC6B67BB734}"/>
+              </a:ext>
+            </a:extLst>
+          </p:cNvPr>
+          <p:cNvPicPr>
+            <a:picLocks noChangeAspect="1"/>
+          </p:cNvPicPr>
+          <p:nvPr/>
+        </p:nvPicPr>
+        <p:blipFill>
+          <a:blip r:embed="rId2"/>
+          <a:stretch>
+            <a:fillRect/>
+          </a:stretch>
+        </p:blipFill>
+        <p:spPr>
+          <a:xfrm>
+            <a:off x="3240460" y="9579"/>
+            <a:ext cx="2952328" cy="6389579"/>
+          </a:xfrm>
+          <a:prstGeom prst="rect">
+            <a:avLst/>
+          </a:prstGeom>
+        </p:spPr>
+      </p:pic>
+    </p:spTree>
+    <p:extLst>
+      <p:ext uri="{BB962C8B-B14F-4D97-AF65-F5344CB8AC3E}">
+        <p14:creationId xmlns:p14="http://schemas.microsoft.com/office/powerpoint/2010/main" val="3931738733"/>
+      </p:ext>
+    </p:extLst>
+  </p:cSld>
+  <p:clrMapOvr>
+    <a:masterClrMapping/>
+  </p:clrMapOvr>
+  <p:transition spd="slow" advClick="0">
+    <p:push/>
+  </p:transition>
+</p:sld>
+</file>
+
+<file path=ppt/slides/slide8.xml><?xml version="1.0" encoding="utf-8"?>
+<p:sld xmlns:a="http://schemas.openxmlformats.org/drawingml/2006/main" xmlns:r="http://schemas.openxmlformats.org/officeDocument/2006/relationships" xmlns:p="http://schemas.openxmlformats.org/presentationml/2006/main">
+  <p:cSld>
+    <p:spTree>
+      <p:nvGrpSpPr>
+        <p:cNvPr id="1" name=""/>
+        <p:cNvGrpSpPr/>
+        <p:nvPr/>
+      </p:nvGrpSpPr>
+      <p:grpSpPr>
+        <a:xfrm>
+          <a:off x="0" y="0"/>
+          <a:ext cx="0" cy="0"/>
+          <a:chOff x="0" y="0"/>
+          <a:chExt cx="0" cy="0"/>
+        </a:xfrm>
+      </p:grpSpPr>
+      <p:pic>
+        <p:nvPicPr>
+          <p:cNvPr id="2" name="그림 1">
+            <a:extLst>
+              <a:ext uri="{FF2B5EF4-FFF2-40B4-BE49-F238E27FC236}">
+                <a16:creationId xmlns:a16="http://schemas.microsoft.com/office/drawing/2014/main" id="{23A98F70-2DF9-4330-B75D-7EC8BF16D087}"/>
+              </a:ext>
+            </a:extLst>
+          </p:cNvPr>
+          <p:cNvPicPr>
+            <a:picLocks noChangeAspect="1"/>
+          </p:cNvPicPr>
+          <p:nvPr/>
+        </p:nvPicPr>
+        <p:blipFill>
+          <a:blip r:embed="rId2"/>
+          <a:stretch>
+            <a:fillRect/>
+          </a:stretch>
+        </p:blipFill>
+        <p:spPr>
+          <a:xfrm>
+            <a:off x="32104" y="612081"/>
+            <a:ext cx="9729079" cy="5472608"/>
+          </a:xfrm>
+          <a:prstGeom prst="rect">
+            <a:avLst/>
+          </a:prstGeom>
+        </p:spPr>
+      </p:pic>
+    </p:spTree>
+    <p:extLst>
+      <p:ext uri="{BB962C8B-B14F-4D97-AF65-F5344CB8AC3E}">
+        <p14:creationId xmlns:p14="http://schemas.microsoft.com/office/powerpoint/2010/main" val="3268199851"/>
       </p:ext>
     </p:extLst>
   </p:cSld>

</xml_diff>

<commit_message>
Remove last 3 pages of report_figures.ppt
</commit_message>
<xml_diff>
--- a/report_figures.pptx
+++ b/report_figures.pptx
@@ -5,10 +5,10 @@
     <p:sldMasterId id="2147483648" r:id="rId1"/>
   </p:sldMasterIdLst>
   <p:notesMasterIdLst>
-    <p:notesMasterId r:id="rId10"/>
+    <p:notesMasterId r:id="rId7"/>
   </p:notesMasterIdLst>
   <p:handoutMasterIdLst>
-    <p:handoutMasterId r:id="rId11"/>
+    <p:handoutMasterId r:id="rId8"/>
   </p:handoutMasterIdLst>
   <p:sldIdLst>
     <p:sldId id="422" r:id="rId2"/>
@@ -16,9 +16,6 @@
     <p:sldId id="424" r:id="rId4"/>
     <p:sldId id="423" r:id="rId5"/>
     <p:sldId id="425" r:id="rId6"/>
-    <p:sldId id="427" r:id="rId7"/>
-    <p:sldId id="428" r:id="rId8"/>
-    <p:sldId id="429" r:id="rId9"/>
   </p:sldIdLst>
   <p:sldSz cx="9793288" cy="6408738"/>
   <p:notesSz cx="6735763" cy="9866313"/>
@@ -7768,201 +7765,6 @@
     <p:extLst>
       <p:ext uri="{BB962C8B-B14F-4D97-AF65-F5344CB8AC3E}">
         <p14:creationId xmlns:p14="http://schemas.microsoft.com/office/powerpoint/2010/main" val="3173386995"/>
-      </p:ext>
-    </p:extLst>
-  </p:cSld>
-  <p:clrMapOvr>
-    <a:masterClrMapping/>
-  </p:clrMapOvr>
-  <p:transition spd="slow" advClick="0">
-    <p:push/>
-  </p:transition>
-</p:sld>
-</file>
-
-<file path=ppt/slides/slide6.xml><?xml version="1.0" encoding="utf-8"?>
-<p:sld xmlns:a="http://schemas.openxmlformats.org/drawingml/2006/main" xmlns:r="http://schemas.openxmlformats.org/officeDocument/2006/relationships" xmlns:p="http://schemas.openxmlformats.org/presentationml/2006/main">
-  <p:cSld>
-    <p:spTree>
-      <p:nvGrpSpPr>
-        <p:cNvPr id="1" name=""/>
-        <p:cNvGrpSpPr/>
-        <p:nvPr/>
-      </p:nvGrpSpPr>
-      <p:grpSpPr>
-        <a:xfrm>
-          <a:off x="0" y="0"/>
-          <a:ext cx="0" cy="0"/>
-          <a:chOff x="0" y="0"/>
-          <a:chExt cx="0" cy="0"/>
-        </a:xfrm>
-      </p:grpSpPr>
-      <p:pic>
-        <p:nvPicPr>
-          <p:cNvPr id="2" name="그림 1" descr="모니터, 컴퓨터, 실내, 전자기기이(가) 표시된 사진&#10;&#10;자동 생성된 설명">
-            <a:extLst>
-              <a:ext uri="{FF2B5EF4-FFF2-40B4-BE49-F238E27FC236}">
-                <a16:creationId xmlns:a16="http://schemas.microsoft.com/office/drawing/2014/main" id="{911BB33C-6CCB-4F8C-A60B-FE49CB7F81F7}"/>
-              </a:ext>
-            </a:extLst>
-          </p:cNvPr>
-          <p:cNvPicPr>
-            <a:picLocks noChangeAspect="1"/>
-          </p:cNvPicPr>
-          <p:nvPr/>
-        </p:nvPicPr>
-        <p:blipFill>
-          <a:blip r:embed="rId2" cstate="print">
-            <a:extLst>
-              <a:ext uri="{28A0092B-C50C-407E-A947-70E740481C1C}">
-                <a14:useLocalDpi xmlns:a14="http://schemas.microsoft.com/office/drawing/2010/main" val="0"/>
-              </a:ext>
-            </a:extLst>
-          </a:blip>
-          <a:stretch>
-            <a:fillRect/>
-          </a:stretch>
-        </p:blipFill>
-        <p:spPr>
-          <a:xfrm>
-            <a:off x="89103" y="576077"/>
-            <a:ext cx="9615082" cy="5256584"/>
-          </a:xfrm>
-          <a:prstGeom prst="rect">
-            <a:avLst/>
-          </a:prstGeom>
-        </p:spPr>
-      </p:pic>
-    </p:spTree>
-    <p:extLst>
-      <p:ext uri="{BB962C8B-B14F-4D97-AF65-F5344CB8AC3E}">
-        <p14:creationId xmlns:p14="http://schemas.microsoft.com/office/powerpoint/2010/main" val="1385185846"/>
-      </p:ext>
-    </p:extLst>
-  </p:cSld>
-  <p:clrMapOvr>
-    <a:masterClrMapping/>
-  </p:clrMapOvr>
-  <p:transition spd="slow" advClick="0">
-    <p:push/>
-  </p:transition>
-</p:sld>
-</file>
-
-<file path=ppt/slides/slide7.xml><?xml version="1.0" encoding="utf-8"?>
-<p:sld xmlns:a="http://schemas.openxmlformats.org/drawingml/2006/main" xmlns:r="http://schemas.openxmlformats.org/officeDocument/2006/relationships" xmlns:p="http://schemas.openxmlformats.org/presentationml/2006/main">
-  <p:cSld>
-    <p:spTree>
-      <p:nvGrpSpPr>
-        <p:cNvPr id="1" name=""/>
-        <p:cNvGrpSpPr/>
-        <p:nvPr/>
-      </p:nvGrpSpPr>
-      <p:grpSpPr>
-        <a:xfrm>
-          <a:off x="0" y="0"/>
-          <a:ext cx="0" cy="0"/>
-          <a:chOff x="0" y="0"/>
-          <a:chExt cx="0" cy="0"/>
-        </a:xfrm>
-      </p:grpSpPr>
-      <p:pic>
-        <p:nvPicPr>
-          <p:cNvPr id="2" name="그림 1">
-            <a:extLst>
-              <a:ext uri="{FF2B5EF4-FFF2-40B4-BE49-F238E27FC236}">
-                <a16:creationId xmlns:a16="http://schemas.microsoft.com/office/drawing/2014/main" id="{662D937F-F57E-4EAB-84CC-6FC6B67BB734}"/>
-              </a:ext>
-            </a:extLst>
-          </p:cNvPr>
-          <p:cNvPicPr>
-            <a:picLocks noChangeAspect="1"/>
-          </p:cNvPicPr>
-          <p:nvPr/>
-        </p:nvPicPr>
-        <p:blipFill>
-          <a:blip r:embed="rId2"/>
-          <a:stretch>
-            <a:fillRect/>
-          </a:stretch>
-        </p:blipFill>
-        <p:spPr>
-          <a:xfrm>
-            <a:off x="3240460" y="9579"/>
-            <a:ext cx="2952328" cy="6389579"/>
-          </a:xfrm>
-          <a:prstGeom prst="rect">
-            <a:avLst/>
-          </a:prstGeom>
-        </p:spPr>
-      </p:pic>
-    </p:spTree>
-    <p:extLst>
-      <p:ext uri="{BB962C8B-B14F-4D97-AF65-F5344CB8AC3E}">
-        <p14:creationId xmlns:p14="http://schemas.microsoft.com/office/powerpoint/2010/main" val="3931738733"/>
-      </p:ext>
-    </p:extLst>
-  </p:cSld>
-  <p:clrMapOvr>
-    <a:masterClrMapping/>
-  </p:clrMapOvr>
-  <p:transition spd="slow" advClick="0">
-    <p:push/>
-  </p:transition>
-</p:sld>
-</file>
-
-<file path=ppt/slides/slide8.xml><?xml version="1.0" encoding="utf-8"?>
-<p:sld xmlns:a="http://schemas.openxmlformats.org/drawingml/2006/main" xmlns:r="http://schemas.openxmlformats.org/officeDocument/2006/relationships" xmlns:p="http://schemas.openxmlformats.org/presentationml/2006/main">
-  <p:cSld>
-    <p:spTree>
-      <p:nvGrpSpPr>
-        <p:cNvPr id="1" name=""/>
-        <p:cNvGrpSpPr/>
-        <p:nvPr/>
-      </p:nvGrpSpPr>
-      <p:grpSpPr>
-        <a:xfrm>
-          <a:off x="0" y="0"/>
-          <a:ext cx="0" cy="0"/>
-          <a:chOff x="0" y="0"/>
-          <a:chExt cx="0" cy="0"/>
-        </a:xfrm>
-      </p:grpSpPr>
-      <p:pic>
-        <p:nvPicPr>
-          <p:cNvPr id="2" name="그림 1">
-            <a:extLst>
-              <a:ext uri="{FF2B5EF4-FFF2-40B4-BE49-F238E27FC236}">
-                <a16:creationId xmlns:a16="http://schemas.microsoft.com/office/drawing/2014/main" id="{23A98F70-2DF9-4330-B75D-7EC8BF16D087}"/>
-              </a:ext>
-            </a:extLst>
-          </p:cNvPr>
-          <p:cNvPicPr>
-            <a:picLocks noChangeAspect="1"/>
-          </p:cNvPicPr>
-          <p:nvPr/>
-        </p:nvPicPr>
-        <p:blipFill>
-          <a:blip r:embed="rId2"/>
-          <a:stretch>
-            <a:fillRect/>
-          </a:stretch>
-        </p:blipFill>
-        <p:spPr>
-          <a:xfrm>
-            <a:off x="32104" y="612081"/>
-            <a:ext cx="9729079" cy="5472608"/>
-          </a:xfrm>
-          <a:prstGeom prst="rect">
-            <a:avLst/>
-          </a:prstGeom>
-        </p:spPr>
-      </p:pic>
-    </p:spTree>
-    <p:extLst>
-      <p:ext uri="{BB962C8B-B14F-4D97-AF65-F5344CB8AC3E}">
-        <p14:creationId xmlns:p14="http://schemas.microsoft.com/office/powerpoint/2010/main" val="3268199851"/>
       </p:ext>
     </p:extLst>
   </p:cSld>

</xml_diff>